<commit_message>
[algorithm] duplicate elements in list Update
</commit_message>
<xml_diff>
--- a/_raw/algorithm/algorithm.pptx
+++ b/_raw/algorithm/algorithm.pptx
@@ -4195,7 +4195,7 @@
           <p:nvPr>
             <p:extLst>
               <p:ext uri="{D42A27DB-BD31-4B8C-83A1-F6EECF244321}">
-                <p14:modId xmlns:p14="http://schemas.microsoft.com/office/powerpoint/2010/main" val="3025400669"/>
+                <p14:modId xmlns:p14="http://schemas.microsoft.com/office/powerpoint/2010/main" val="2406064504"/>
               </p:ext>
             </p:extLst>
           </p:nvPr>
@@ -4317,7 +4317,65 @@
                           <a:latin typeface="Noto Sans KR Medium" panose="020B0500000000000000" pitchFamily="34" charset="-128"/>
                           <a:ea typeface="Noto Sans KR Medium" panose="020B0500000000000000" pitchFamily="34" charset="-128"/>
                         </a:rPr>
-                        <a:t>2</a:t>
+                        <a:t>1</a:t>
+                      </a:r>
+                      <a:endParaRPr lang="ko-KR" altLang="en-US" b="0" i="0" dirty="0">
+                        <a:latin typeface="Noto Sans KR Medium" panose="020B0500000000000000" pitchFamily="34" charset="-128"/>
+                        <a:ea typeface="Noto Sans KR Medium" panose="020B0500000000000000" pitchFamily="34" charset="-128"/>
+                      </a:endParaRPr>
+                    </a:p>
+                  </a:txBody>
+                  <a:tcPr>
+                    <a:lnL w="12700" cap="flat" cmpd="sng" algn="ctr">
+                      <a:solidFill>
+                        <a:schemeClr val="tx1"/>
+                      </a:solidFill>
+                      <a:prstDash val="solid"/>
+                      <a:round/>
+                      <a:headEnd type="none" w="med" len="med"/>
+                      <a:tailEnd type="none" w="med" len="med"/>
+                    </a:lnL>
+                    <a:lnR w="12700" cap="flat" cmpd="sng" algn="ctr">
+                      <a:solidFill>
+                        <a:schemeClr val="tx1"/>
+                      </a:solidFill>
+                      <a:prstDash val="solid"/>
+                      <a:round/>
+                      <a:headEnd type="none" w="med" len="med"/>
+                      <a:tailEnd type="none" w="med" len="med"/>
+                    </a:lnR>
+                    <a:lnT w="12700" cap="flat" cmpd="sng" algn="ctr">
+                      <a:solidFill>
+                        <a:schemeClr val="tx1"/>
+                      </a:solidFill>
+                      <a:prstDash val="solid"/>
+                      <a:round/>
+                      <a:headEnd type="none" w="med" len="med"/>
+                      <a:tailEnd type="none" w="med" len="med"/>
+                    </a:lnT>
+                    <a:lnB w="12700" cap="flat" cmpd="sng" algn="ctr">
+                      <a:solidFill>
+                        <a:schemeClr val="tx1"/>
+                      </a:solidFill>
+                      <a:prstDash val="solid"/>
+                      <a:round/>
+                      <a:headEnd type="none" w="med" len="med"/>
+                      <a:tailEnd type="none" w="med" len="med"/>
+                    </a:lnB>
+                  </a:tcPr>
+                </a:tc>
+                <a:tc>
+                  <a:txBody>
+                    <a:bodyPr/>
+                    <a:lstStyle/>
+                    <a:p>
+                      <a:pPr algn="ctr" latinLnBrk="1"/>
+                      <a:r>
+                        <a:rPr lang="en-US" altLang="ko-KR" b="0" i="0" dirty="0">
+                          <a:latin typeface="Noto Sans KR Medium" panose="020B0500000000000000" pitchFamily="34" charset="-128"/>
+                          <a:ea typeface="Noto Sans KR Medium" panose="020B0500000000000000" pitchFamily="34" charset="-128"/>
+                        </a:rPr>
+                        <a:t>0</a:t>
                       </a:r>
                       <a:endParaRPr lang="ko-KR" altLang="en-US" b="0" i="0" dirty="0">
                         <a:latin typeface="Noto Sans KR Medium" panose="020B0500000000000000" pitchFamily="34" charset="-128"/>
@@ -4433,64 +4491,6 @@
                           <a:latin typeface="Noto Sans KR Medium" panose="020B0500000000000000" pitchFamily="34" charset="-128"/>
                           <a:ea typeface="Noto Sans KR Medium" panose="020B0500000000000000" pitchFamily="34" charset="-128"/>
                         </a:rPr>
-                        <a:t>1</a:t>
-                      </a:r>
-                      <a:endParaRPr lang="ko-KR" altLang="en-US" b="0" i="0" dirty="0">
-                        <a:latin typeface="Noto Sans KR Medium" panose="020B0500000000000000" pitchFamily="34" charset="-128"/>
-                        <a:ea typeface="Noto Sans KR Medium" panose="020B0500000000000000" pitchFamily="34" charset="-128"/>
-                      </a:endParaRPr>
-                    </a:p>
-                  </a:txBody>
-                  <a:tcPr>
-                    <a:lnL w="12700" cap="flat" cmpd="sng" algn="ctr">
-                      <a:solidFill>
-                        <a:schemeClr val="tx1"/>
-                      </a:solidFill>
-                      <a:prstDash val="solid"/>
-                      <a:round/>
-                      <a:headEnd type="none" w="med" len="med"/>
-                      <a:tailEnd type="none" w="med" len="med"/>
-                    </a:lnL>
-                    <a:lnR w="12700" cap="flat" cmpd="sng" algn="ctr">
-                      <a:solidFill>
-                        <a:schemeClr val="tx1"/>
-                      </a:solidFill>
-                      <a:prstDash val="solid"/>
-                      <a:round/>
-                      <a:headEnd type="none" w="med" len="med"/>
-                      <a:tailEnd type="none" w="med" len="med"/>
-                    </a:lnR>
-                    <a:lnT w="12700" cap="flat" cmpd="sng" algn="ctr">
-                      <a:solidFill>
-                        <a:schemeClr val="tx1"/>
-                      </a:solidFill>
-                      <a:prstDash val="solid"/>
-                      <a:round/>
-                      <a:headEnd type="none" w="med" len="med"/>
-                      <a:tailEnd type="none" w="med" len="med"/>
-                    </a:lnT>
-                    <a:lnB w="12700" cap="flat" cmpd="sng" algn="ctr">
-                      <a:solidFill>
-                        <a:schemeClr val="tx1"/>
-                      </a:solidFill>
-                      <a:prstDash val="solid"/>
-                      <a:round/>
-                      <a:headEnd type="none" w="med" len="med"/>
-                      <a:tailEnd type="none" w="med" len="med"/>
-                    </a:lnB>
-                  </a:tcPr>
-                </a:tc>
-                <a:tc>
-                  <a:txBody>
-                    <a:bodyPr/>
-                    <a:lstStyle/>
-                    <a:p>
-                      <a:pPr algn="ctr" latinLnBrk="1"/>
-                      <a:r>
-                        <a:rPr lang="en-US" altLang="ko-KR" b="0" i="0" dirty="0">
-                          <a:latin typeface="Noto Sans KR Medium" panose="020B0500000000000000" pitchFamily="34" charset="-128"/>
-                          <a:ea typeface="Noto Sans KR Medium" panose="020B0500000000000000" pitchFamily="34" charset="-128"/>
-                        </a:rPr>
                         <a:t>4</a:t>
                       </a:r>
                       <a:endParaRPr lang="ko-KR" altLang="en-US" b="0" i="0" dirty="0">
@@ -4871,7 +4871,7 @@
           <p:nvPr>
             <p:extLst>
               <p:ext uri="{D42A27DB-BD31-4B8C-83A1-F6EECF244321}">
-                <p14:modId xmlns:p14="http://schemas.microsoft.com/office/powerpoint/2010/main" val="2087097513"/>
+                <p14:modId xmlns:p14="http://schemas.microsoft.com/office/powerpoint/2010/main" val="3351872196"/>
               </p:ext>
             </p:extLst>
           </p:nvPr>
@@ -4993,7 +4993,7 @@
                           <a:latin typeface="Noto Sans KR Medium" panose="020B0500000000000000" pitchFamily="34" charset="-128"/>
                           <a:ea typeface="Noto Sans KR Medium" panose="020B0500000000000000" pitchFamily="34" charset="-128"/>
                         </a:rPr>
-                        <a:t>2</a:t>
+                        <a:t>1</a:t>
                       </a:r>
                       <a:endParaRPr lang="ko-KR" altLang="en-US" b="0" i="0" dirty="0">
                         <a:latin typeface="Noto Sans KR Medium" panose="020B0500000000000000" pitchFamily="34" charset="-128"/>
@@ -5051,7 +5051,7 @@
                           <a:latin typeface="Noto Sans KR Medium" panose="020B0500000000000000" pitchFamily="34" charset="-128"/>
                           <a:ea typeface="Noto Sans KR Medium" panose="020B0500000000000000" pitchFamily="34" charset="-128"/>
                         </a:rPr>
-                        <a:t>1</a:t>
+                        <a:t>0</a:t>
                       </a:r>
                       <a:endParaRPr lang="ko-KR" altLang="en-US" b="0" i="0" dirty="0">
                         <a:latin typeface="Noto Sans KR Medium" panose="020B0500000000000000" pitchFamily="34" charset="-128"/>
@@ -5497,7 +5497,7 @@
           <p:nvPr>
             <p:extLst>
               <p:ext uri="{D42A27DB-BD31-4B8C-83A1-F6EECF244321}">
-                <p14:modId xmlns:p14="http://schemas.microsoft.com/office/powerpoint/2010/main" val="2585943686"/>
+                <p14:modId xmlns:p14="http://schemas.microsoft.com/office/powerpoint/2010/main" val="3297681285"/>
               </p:ext>
             </p:extLst>
           </p:nvPr>
@@ -5616,12 +5616,18 @@
                       <a:pPr algn="ctr" latinLnBrk="1"/>
                       <a:r>
                         <a:rPr lang="en-US" altLang="ko-KR" b="0" i="0" dirty="0">
+                          <a:solidFill>
+                            <a:srgbClr val="FEB90E"/>
+                          </a:solidFill>
                           <a:latin typeface="Noto Sans KR Medium" panose="020B0500000000000000" pitchFamily="34" charset="-128"/>
                           <a:ea typeface="Noto Sans KR Medium" panose="020B0500000000000000" pitchFamily="34" charset="-128"/>
                         </a:rPr>
-                        <a:t>2</a:t>
+                        <a:t>-1</a:t>
                       </a:r>
                       <a:endParaRPr lang="ko-KR" altLang="en-US" b="0" i="0" dirty="0">
+                        <a:solidFill>
+                          <a:srgbClr val="FEB90E"/>
+                        </a:solidFill>
                         <a:latin typeface="Noto Sans KR Medium" panose="020B0500000000000000" pitchFamily="34" charset="-128"/>
                         <a:ea typeface="Noto Sans KR Medium" panose="020B0500000000000000" pitchFamily="34" charset="-128"/>
                       </a:endParaRPr>
@@ -5675,16 +5681,16 @@
                       <a:r>
                         <a:rPr lang="en-US" altLang="ko-KR" b="0" i="0" dirty="0">
                           <a:solidFill>
-                            <a:srgbClr val="FEB90E"/>
+                            <a:schemeClr val="tx1"/>
                           </a:solidFill>
                           <a:latin typeface="Noto Sans KR Medium" panose="020B0500000000000000" pitchFamily="34" charset="-128"/>
                           <a:ea typeface="Noto Sans KR Medium" panose="020B0500000000000000" pitchFamily="34" charset="-128"/>
                         </a:rPr>
-                        <a:t>-1</a:t>
+                        <a:t>0</a:t>
                       </a:r>
                       <a:endParaRPr lang="ko-KR" altLang="en-US" b="0" i="0" dirty="0">
                         <a:solidFill>
-                          <a:srgbClr val="FEB90E"/>
+                          <a:schemeClr val="tx1"/>
                         </a:solidFill>
                         <a:latin typeface="Noto Sans KR Medium" panose="020B0500000000000000" pitchFamily="34" charset="-128"/>
                         <a:ea typeface="Noto Sans KR Medium" panose="020B0500000000000000" pitchFamily="34" charset="-128"/>
@@ -6129,7 +6135,7 @@
           <p:nvPr>
             <p:extLst>
               <p:ext uri="{D42A27DB-BD31-4B8C-83A1-F6EECF244321}">
-                <p14:modId xmlns:p14="http://schemas.microsoft.com/office/powerpoint/2010/main" val="1352469956"/>
+                <p14:modId xmlns:p14="http://schemas.microsoft.com/office/powerpoint/2010/main" val="1353866398"/>
               </p:ext>
             </p:extLst>
           </p:nvPr>
@@ -6190,12 +6196,18 @@
                       <a:pPr algn="ctr" latinLnBrk="1"/>
                       <a:r>
                         <a:rPr lang="en-US" altLang="ko-KR" b="0" i="0" dirty="0">
+                          <a:solidFill>
+                            <a:srgbClr val="FEB90E"/>
+                          </a:solidFill>
                           <a:latin typeface="Noto Sans KR Medium" panose="020B0500000000000000" pitchFamily="34" charset="-128"/>
                           <a:ea typeface="Noto Sans KR Medium" panose="020B0500000000000000" pitchFamily="34" charset="-128"/>
                         </a:rPr>
-                        <a:t>3</a:t>
+                        <a:t>-3</a:t>
                       </a:r>
                       <a:endParaRPr lang="ko-KR" altLang="en-US" b="0" i="0" dirty="0">
+                        <a:solidFill>
+                          <a:srgbClr val="FEB90E"/>
+                        </a:solidFill>
                         <a:latin typeface="Noto Sans KR Medium" panose="020B0500000000000000" pitchFamily="34" charset="-128"/>
                         <a:ea typeface="Noto Sans KR Medium" panose="020B0500000000000000" pitchFamily="34" charset="-128"/>
                       </a:endParaRPr>
@@ -6251,9 +6263,596 @@
                           <a:latin typeface="Noto Sans KR Medium" panose="020B0500000000000000" pitchFamily="34" charset="-128"/>
                           <a:ea typeface="Noto Sans KR Medium" panose="020B0500000000000000" pitchFamily="34" charset="-128"/>
                         </a:rPr>
-                        <a:t>2</a:t>
+                        <a:t>-1</a:t>
                       </a:r>
                       <a:endParaRPr lang="ko-KR" altLang="en-US" b="0" i="0" dirty="0">
+                        <a:latin typeface="Noto Sans KR Medium" panose="020B0500000000000000" pitchFamily="34" charset="-128"/>
+                        <a:ea typeface="Noto Sans KR Medium" panose="020B0500000000000000" pitchFamily="34" charset="-128"/>
+                      </a:endParaRPr>
+                    </a:p>
+                  </a:txBody>
+                  <a:tcPr>
+                    <a:lnL w="12700" cap="flat" cmpd="sng" algn="ctr">
+                      <a:solidFill>
+                        <a:schemeClr val="tx1"/>
+                      </a:solidFill>
+                      <a:prstDash val="solid"/>
+                      <a:round/>
+                      <a:headEnd type="none" w="med" len="med"/>
+                      <a:tailEnd type="none" w="med" len="med"/>
+                    </a:lnL>
+                    <a:lnR w="12700" cap="flat" cmpd="sng" algn="ctr">
+                      <a:solidFill>
+                        <a:schemeClr val="tx1"/>
+                      </a:solidFill>
+                      <a:prstDash val="solid"/>
+                      <a:round/>
+                      <a:headEnd type="none" w="med" len="med"/>
+                      <a:tailEnd type="none" w="med" len="med"/>
+                    </a:lnR>
+                    <a:lnT w="12700" cap="flat" cmpd="sng" algn="ctr">
+                      <a:solidFill>
+                        <a:schemeClr val="tx1"/>
+                      </a:solidFill>
+                      <a:prstDash val="solid"/>
+                      <a:round/>
+                      <a:headEnd type="none" w="med" len="med"/>
+                      <a:tailEnd type="none" w="med" len="med"/>
+                    </a:lnT>
+                    <a:lnB w="12700" cap="flat" cmpd="sng" algn="ctr">
+                      <a:solidFill>
+                        <a:schemeClr val="tx1"/>
+                      </a:solidFill>
+                      <a:prstDash val="solid"/>
+                      <a:round/>
+                      <a:headEnd type="none" w="med" len="med"/>
+                      <a:tailEnd type="none" w="med" len="med"/>
+                    </a:lnB>
+                  </a:tcPr>
+                </a:tc>
+                <a:tc>
+                  <a:txBody>
+                    <a:bodyPr/>
+                    <a:lstStyle/>
+                    <a:p>
+                      <a:pPr algn="ctr" latinLnBrk="1"/>
+                      <a:r>
+                        <a:rPr lang="en-US" altLang="ko-KR" b="0" i="0" dirty="0">
+                          <a:solidFill>
+                            <a:schemeClr val="tx1"/>
+                          </a:solidFill>
+                          <a:latin typeface="Noto Sans KR Medium" panose="020B0500000000000000" pitchFamily="34" charset="-128"/>
+                          <a:ea typeface="Noto Sans KR Medium" panose="020B0500000000000000" pitchFamily="34" charset="-128"/>
+                        </a:rPr>
+                        <a:t>0</a:t>
+                      </a:r>
+                      <a:endParaRPr lang="ko-KR" altLang="en-US" b="0" i="0" dirty="0">
+                        <a:solidFill>
+                          <a:srgbClr val="FF0000"/>
+                        </a:solidFill>
+                        <a:latin typeface="Noto Sans KR Medium" panose="020B0500000000000000" pitchFamily="34" charset="-128"/>
+                        <a:ea typeface="Noto Sans KR Medium" panose="020B0500000000000000" pitchFamily="34" charset="-128"/>
+                      </a:endParaRPr>
+                    </a:p>
+                  </a:txBody>
+                  <a:tcPr>
+                    <a:lnL w="12700" cap="flat" cmpd="sng" algn="ctr">
+                      <a:solidFill>
+                        <a:schemeClr val="tx1"/>
+                      </a:solidFill>
+                      <a:prstDash val="solid"/>
+                      <a:round/>
+                      <a:headEnd type="none" w="med" len="med"/>
+                      <a:tailEnd type="none" w="med" len="med"/>
+                    </a:lnL>
+                    <a:lnR w="12700" cap="flat" cmpd="sng" algn="ctr">
+                      <a:solidFill>
+                        <a:schemeClr val="tx1"/>
+                      </a:solidFill>
+                      <a:prstDash val="solid"/>
+                      <a:round/>
+                      <a:headEnd type="none" w="med" len="med"/>
+                      <a:tailEnd type="none" w="med" len="med"/>
+                    </a:lnR>
+                    <a:lnT w="12700" cap="flat" cmpd="sng" algn="ctr">
+                      <a:solidFill>
+                        <a:schemeClr val="tx1"/>
+                      </a:solidFill>
+                      <a:prstDash val="solid"/>
+                      <a:round/>
+                      <a:headEnd type="none" w="med" len="med"/>
+                      <a:tailEnd type="none" w="med" len="med"/>
+                    </a:lnT>
+                    <a:lnB w="12700" cap="flat" cmpd="sng" algn="ctr">
+                      <a:solidFill>
+                        <a:schemeClr val="tx1"/>
+                      </a:solidFill>
+                      <a:prstDash val="solid"/>
+                      <a:round/>
+                      <a:headEnd type="none" w="med" len="med"/>
+                      <a:tailEnd type="none" w="med" len="med"/>
+                    </a:lnB>
+                  </a:tcPr>
+                </a:tc>
+                <a:tc>
+                  <a:txBody>
+                    <a:bodyPr/>
+                    <a:lstStyle/>
+                    <a:p>
+                      <a:pPr algn="ctr" latinLnBrk="1"/>
+                      <a:r>
+                        <a:rPr lang="en-US" altLang="ko-KR" b="0" i="0" dirty="0">
+                          <a:solidFill>
+                            <a:schemeClr val="tx1"/>
+                          </a:solidFill>
+                          <a:latin typeface="Noto Sans KR Medium" panose="020B0500000000000000" pitchFamily="34" charset="-128"/>
+                          <a:ea typeface="Noto Sans KR Medium" panose="020B0500000000000000" pitchFamily="34" charset="-128"/>
+                        </a:rPr>
+                        <a:t>-1</a:t>
+                      </a:r>
+                      <a:endParaRPr lang="ko-KR" altLang="en-US" b="0" i="0" dirty="0">
+                        <a:solidFill>
+                          <a:schemeClr val="tx1"/>
+                        </a:solidFill>
+                        <a:latin typeface="Noto Sans KR Medium" panose="020B0500000000000000" pitchFamily="34" charset="-128"/>
+                        <a:ea typeface="Noto Sans KR Medium" panose="020B0500000000000000" pitchFamily="34" charset="-128"/>
+                      </a:endParaRPr>
+                    </a:p>
+                  </a:txBody>
+                  <a:tcPr>
+                    <a:lnL w="12700" cap="flat" cmpd="sng" algn="ctr">
+                      <a:solidFill>
+                        <a:schemeClr val="tx1"/>
+                      </a:solidFill>
+                      <a:prstDash val="solid"/>
+                      <a:round/>
+                      <a:headEnd type="none" w="med" len="med"/>
+                      <a:tailEnd type="none" w="med" len="med"/>
+                    </a:lnL>
+                    <a:lnR w="12700" cap="flat" cmpd="sng" algn="ctr">
+                      <a:solidFill>
+                        <a:schemeClr val="tx1"/>
+                      </a:solidFill>
+                      <a:prstDash val="solid"/>
+                      <a:round/>
+                      <a:headEnd type="none" w="med" len="med"/>
+                      <a:tailEnd type="none" w="med" len="med"/>
+                    </a:lnR>
+                    <a:lnT w="12700" cap="flat" cmpd="sng" algn="ctr">
+                      <a:solidFill>
+                        <a:schemeClr val="tx1"/>
+                      </a:solidFill>
+                      <a:prstDash val="solid"/>
+                      <a:round/>
+                      <a:headEnd type="none" w="med" len="med"/>
+                      <a:tailEnd type="none" w="med" len="med"/>
+                    </a:lnT>
+                    <a:lnB w="12700" cap="flat" cmpd="sng" algn="ctr">
+                      <a:solidFill>
+                        <a:schemeClr val="tx1"/>
+                      </a:solidFill>
+                      <a:prstDash val="solid"/>
+                      <a:round/>
+                      <a:headEnd type="none" w="med" len="med"/>
+                      <a:tailEnd type="none" w="med" len="med"/>
+                    </a:lnB>
+                  </a:tcPr>
+                </a:tc>
+                <a:tc>
+                  <a:txBody>
+                    <a:bodyPr/>
+                    <a:lstStyle/>
+                    <a:p>
+                      <a:pPr algn="ctr" latinLnBrk="1"/>
+                      <a:r>
+                        <a:rPr lang="en-US" altLang="ko-KR" b="0" i="0" dirty="0">
+                          <a:latin typeface="Noto Sans KR Medium" panose="020B0500000000000000" pitchFamily="34" charset="-128"/>
+                          <a:ea typeface="Noto Sans KR Medium" panose="020B0500000000000000" pitchFamily="34" charset="-128"/>
+                        </a:rPr>
+                        <a:t>4</a:t>
+                      </a:r>
+                      <a:endParaRPr lang="ko-KR" altLang="en-US" b="0" i="0" dirty="0">
+                        <a:latin typeface="Noto Sans KR Medium" panose="020B0500000000000000" pitchFamily="34" charset="-128"/>
+                        <a:ea typeface="Noto Sans KR Medium" panose="020B0500000000000000" pitchFamily="34" charset="-128"/>
+                      </a:endParaRPr>
+                    </a:p>
+                  </a:txBody>
+                  <a:tcPr>
+                    <a:lnL w="12700" cap="flat" cmpd="sng" algn="ctr">
+                      <a:solidFill>
+                        <a:schemeClr val="tx1"/>
+                      </a:solidFill>
+                      <a:prstDash val="solid"/>
+                      <a:round/>
+                      <a:headEnd type="none" w="med" len="med"/>
+                      <a:tailEnd type="none" w="med" len="med"/>
+                    </a:lnL>
+                    <a:lnR w="12700" cap="flat" cmpd="sng" algn="ctr">
+                      <a:solidFill>
+                        <a:schemeClr val="tx1"/>
+                      </a:solidFill>
+                      <a:prstDash val="solid"/>
+                      <a:round/>
+                      <a:headEnd type="none" w="med" len="med"/>
+                      <a:tailEnd type="none" w="med" len="med"/>
+                    </a:lnR>
+                    <a:lnT w="12700" cap="flat" cmpd="sng" algn="ctr">
+                      <a:solidFill>
+                        <a:schemeClr val="tx1"/>
+                      </a:solidFill>
+                      <a:prstDash val="solid"/>
+                      <a:round/>
+                      <a:headEnd type="none" w="med" len="med"/>
+                      <a:tailEnd type="none" w="med" len="med"/>
+                    </a:lnT>
+                    <a:lnB w="12700" cap="flat" cmpd="sng" algn="ctr">
+                      <a:solidFill>
+                        <a:schemeClr val="tx1"/>
+                      </a:solidFill>
+                      <a:prstDash val="solid"/>
+                      <a:round/>
+                      <a:headEnd type="none" w="med" len="med"/>
+                      <a:tailEnd type="none" w="med" len="med"/>
+                    </a:lnB>
+                  </a:tcPr>
+                </a:tc>
+                <a:extLst>
+                  <a:ext uri="{0D108BD9-81ED-4DB2-BD59-A6C34878D82A}">
+                    <a16:rowId xmlns:a16="http://schemas.microsoft.com/office/drawing/2014/main" val="2423824993"/>
+                  </a:ext>
+                </a:extLst>
+              </a:tr>
+            </a:tbl>
+          </a:graphicData>
+        </a:graphic>
+      </p:graphicFrame>
+      <p:sp>
+        <p:nvSpPr>
+          <p:cNvPr id="31" name="TextBox 30">
+            <a:extLst>
+              <a:ext uri="{FF2B5EF4-FFF2-40B4-BE49-F238E27FC236}">
+                <a16:creationId xmlns:a16="http://schemas.microsoft.com/office/drawing/2014/main" id="{D119D8AB-93A9-9A45-8B7E-69CB42982098}"/>
+              </a:ext>
+            </a:extLst>
+          </p:cNvPr>
+          <p:cNvSpPr txBox="1"/>
+          <p:nvPr/>
+        </p:nvSpPr>
+        <p:spPr>
+          <a:xfrm>
+            <a:off x="3985590" y="4753222"/>
+            <a:ext cx="675861" cy="307777"/>
+          </a:xfrm>
+          <a:prstGeom prst="rect">
+            <a:avLst/>
+          </a:prstGeom>
+          <a:noFill/>
+        </p:spPr>
+        <p:txBody>
+          <a:bodyPr wrap="square" rtlCol="0">
+            <a:spAutoFit/>
+          </a:bodyPr>
+          <a:lstStyle/>
+          <a:p>
+            <a:r>
+              <a:rPr kumimoji="1" lang="en-US" altLang="ko-KR" sz="1400" dirty="0">
+                <a:latin typeface="Noto Sans KR" panose="020B0500000000000000" pitchFamily="34" charset="-128"/>
+                <a:ea typeface="Noto Sans KR" panose="020B0500000000000000" pitchFamily="34" charset="-128"/>
+              </a:rPr>
+              <a:t>  0  </a:t>
+            </a:r>
+            <a:endParaRPr kumimoji="1" lang="ko-KR" altLang="en-US" sz="1400" dirty="0">
+              <a:latin typeface="Noto Sans KR" panose="020B0500000000000000" pitchFamily="34" charset="-128"/>
+              <a:ea typeface="Noto Sans KR" panose="020B0500000000000000" pitchFamily="34" charset="-128"/>
+            </a:endParaRPr>
+          </a:p>
+        </p:txBody>
+      </p:sp>
+      <p:sp>
+        <p:nvSpPr>
+          <p:cNvPr id="32" name="TextBox 31">
+            <a:extLst>
+              <a:ext uri="{FF2B5EF4-FFF2-40B4-BE49-F238E27FC236}">
+                <a16:creationId xmlns:a16="http://schemas.microsoft.com/office/drawing/2014/main" id="{F932BE96-EA8D-894E-8443-F056225E8031}"/>
+              </a:ext>
+            </a:extLst>
+          </p:cNvPr>
+          <p:cNvSpPr txBox="1"/>
+          <p:nvPr/>
+        </p:nvSpPr>
+        <p:spPr>
+          <a:xfrm>
+            <a:off x="5231295" y="4753222"/>
+            <a:ext cx="675861" cy="307777"/>
+          </a:xfrm>
+          <a:prstGeom prst="rect">
+            <a:avLst/>
+          </a:prstGeom>
+          <a:noFill/>
+        </p:spPr>
+        <p:txBody>
+          <a:bodyPr wrap="square" rtlCol="0">
+            <a:spAutoFit/>
+          </a:bodyPr>
+          <a:lstStyle/>
+          <a:p>
+            <a:r>
+              <a:rPr kumimoji="1" lang="en-US" altLang="ko-KR" sz="1400" dirty="0">
+                <a:latin typeface="Noto Sans KR" panose="020B0500000000000000" pitchFamily="34" charset="-128"/>
+                <a:ea typeface="Noto Sans KR" panose="020B0500000000000000" pitchFamily="34" charset="-128"/>
+              </a:rPr>
+              <a:t>  1 </a:t>
+            </a:r>
+            <a:endParaRPr kumimoji="1" lang="ko-KR" altLang="en-US" sz="1400" dirty="0">
+              <a:latin typeface="Noto Sans KR" panose="020B0500000000000000" pitchFamily="34" charset="-128"/>
+              <a:ea typeface="Noto Sans KR" panose="020B0500000000000000" pitchFamily="34" charset="-128"/>
+            </a:endParaRPr>
+          </a:p>
+        </p:txBody>
+      </p:sp>
+      <p:sp>
+        <p:nvSpPr>
+          <p:cNvPr id="33" name="TextBox 32">
+            <a:extLst>
+              <a:ext uri="{FF2B5EF4-FFF2-40B4-BE49-F238E27FC236}">
+                <a16:creationId xmlns:a16="http://schemas.microsoft.com/office/drawing/2014/main" id="{71EA34D8-6882-6643-BA36-1CE124B7C08F}"/>
+              </a:ext>
+            </a:extLst>
+          </p:cNvPr>
+          <p:cNvSpPr txBox="1"/>
+          <p:nvPr/>
+        </p:nvSpPr>
+        <p:spPr>
+          <a:xfrm>
+            <a:off x="6404115" y="4753222"/>
+            <a:ext cx="675861" cy="307777"/>
+          </a:xfrm>
+          <a:prstGeom prst="rect">
+            <a:avLst/>
+          </a:prstGeom>
+          <a:noFill/>
+        </p:spPr>
+        <p:txBody>
+          <a:bodyPr wrap="square" rtlCol="0">
+            <a:spAutoFit/>
+          </a:bodyPr>
+          <a:lstStyle/>
+          <a:p>
+            <a:r>
+              <a:rPr kumimoji="1" lang="en-US" altLang="ko-KR" sz="1400" dirty="0">
+                <a:latin typeface="Noto Sans KR" panose="020B0500000000000000" pitchFamily="34" charset="-128"/>
+                <a:ea typeface="Noto Sans KR" panose="020B0500000000000000" pitchFamily="34" charset="-128"/>
+              </a:rPr>
+              <a:t>  2 </a:t>
+            </a:r>
+            <a:endParaRPr kumimoji="1" lang="ko-KR" altLang="en-US" sz="1400" dirty="0">
+              <a:latin typeface="Noto Sans KR" panose="020B0500000000000000" pitchFamily="34" charset="-128"/>
+              <a:ea typeface="Noto Sans KR" panose="020B0500000000000000" pitchFamily="34" charset="-128"/>
+            </a:endParaRPr>
+          </a:p>
+        </p:txBody>
+      </p:sp>
+      <p:sp>
+        <p:nvSpPr>
+          <p:cNvPr id="34" name="TextBox 33">
+            <a:extLst>
+              <a:ext uri="{FF2B5EF4-FFF2-40B4-BE49-F238E27FC236}">
+                <a16:creationId xmlns:a16="http://schemas.microsoft.com/office/drawing/2014/main" id="{9355B778-1BCB-604F-BBCC-BC2E66F8A82E}"/>
+              </a:ext>
+            </a:extLst>
+          </p:cNvPr>
+          <p:cNvSpPr txBox="1"/>
+          <p:nvPr/>
+        </p:nvSpPr>
+        <p:spPr>
+          <a:xfrm>
+            <a:off x="7649820" y="4753222"/>
+            <a:ext cx="675861" cy="307777"/>
+          </a:xfrm>
+          <a:prstGeom prst="rect">
+            <a:avLst/>
+          </a:prstGeom>
+          <a:noFill/>
+        </p:spPr>
+        <p:txBody>
+          <a:bodyPr wrap="square" rtlCol="0">
+            <a:spAutoFit/>
+          </a:bodyPr>
+          <a:lstStyle/>
+          <a:p>
+            <a:r>
+              <a:rPr kumimoji="1" lang="en-US" altLang="ko-KR" sz="1400" dirty="0">
+                <a:latin typeface="Noto Sans KR" panose="020B0500000000000000" pitchFamily="34" charset="-128"/>
+                <a:ea typeface="Noto Sans KR" panose="020B0500000000000000" pitchFamily="34" charset="-128"/>
+              </a:rPr>
+              <a:t>  3 </a:t>
+            </a:r>
+            <a:endParaRPr kumimoji="1" lang="ko-KR" altLang="en-US" sz="1400" dirty="0">
+              <a:latin typeface="Noto Sans KR" panose="020B0500000000000000" pitchFamily="34" charset="-128"/>
+              <a:ea typeface="Noto Sans KR" panose="020B0500000000000000" pitchFamily="34" charset="-128"/>
+            </a:endParaRPr>
+          </a:p>
+        </p:txBody>
+      </p:sp>
+      <p:sp>
+        <p:nvSpPr>
+          <p:cNvPr id="35" name="TextBox 34">
+            <a:extLst>
+              <a:ext uri="{FF2B5EF4-FFF2-40B4-BE49-F238E27FC236}">
+                <a16:creationId xmlns:a16="http://schemas.microsoft.com/office/drawing/2014/main" id="{2846ACD2-676B-B94C-8C7F-091F477B71F8}"/>
+              </a:ext>
+            </a:extLst>
+          </p:cNvPr>
+          <p:cNvSpPr txBox="1"/>
+          <p:nvPr/>
+        </p:nvSpPr>
+        <p:spPr>
+          <a:xfrm>
+            <a:off x="8895524" y="4768338"/>
+            <a:ext cx="675861" cy="307777"/>
+          </a:xfrm>
+          <a:prstGeom prst="rect">
+            <a:avLst/>
+          </a:prstGeom>
+          <a:noFill/>
+        </p:spPr>
+        <p:txBody>
+          <a:bodyPr wrap="square" rtlCol="0">
+            <a:spAutoFit/>
+          </a:bodyPr>
+          <a:lstStyle/>
+          <a:p>
+            <a:r>
+              <a:rPr kumimoji="1" lang="en-US" altLang="ko-KR" sz="1400" dirty="0">
+                <a:latin typeface="Noto Sans KR" panose="020B0500000000000000" pitchFamily="34" charset="-128"/>
+                <a:ea typeface="Noto Sans KR" panose="020B0500000000000000" pitchFamily="34" charset="-128"/>
+              </a:rPr>
+              <a:t>  4</a:t>
+            </a:r>
+            <a:endParaRPr kumimoji="1" lang="ko-KR" altLang="en-US" sz="1400" dirty="0">
+              <a:latin typeface="Noto Sans KR" panose="020B0500000000000000" pitchFamily="34" charset="-128"/>
+              <a:ea typeface="Noto Sans KR" panose="020B0500000000000000" pitchFamily="34" charset="-128"/>
+            </a:endParaRPr>
+          </a:p>
+        </p:txBody>
+      </p:sp>
+      <p:sp>
+        <p:nvSpPr>
+          <p:cNvPr id="38" name="TextBox 37">
+            <a:extLst>
+              <a:ext uri="{FF2B5EF4-FFF2-40B4-BE49-F238E27FC236}">
+                <a16:creationId xmlns:a16="http://schemas.microsoft.com/office/drawing/2014/main" id="{A50D781C-CA37-F549-8E3A-6D902CE64419}"/>
+              </a:ext>
+            </a:extLst>
+          </p:cNvPr>
+          <p:cNvSpPr txBox="1"/>
+          <p:nvPr/>
+        </p:nvSpPr>
+        <p:spPr>
+          <a:xfrm>
+            <a:off x="966578" y="5441077"/>
+            <a:ext cx="3308074" cy="307777"/>
+          </a:xfrm>
+          <a:prstGeom prst="rect">
+            <a:avLst/>
+          </a:prstGeom>
+          <a:noFill/>
+        </p:spPr>
+        <p:txBody>
+          <a:bodyPr wrap="square" rtlCol="0">
+            <a:spAutoFit/>
+          </a:bodyPr>
+          <a:lstStyle/>
+          <a:p>
+            <a:r>
+              <a:rPr kumimoji="1" lang="en-US" altLang="ko-KR" sz="1400">
+                <a:latin typeface="Noto Sans KR" panose="020B0500000000000000" pitchFamily="34" charset="-128"/>
+                <a:ea typeface="Noto Sans KR" panose="020B0500000000000000" pitchFamily="34" charset="-128"/>
+              </a:rPr>
+              <a:t>  Step4. </a:t>
+            </a:r>
+            <a:r>
+              <a:rPr kumimoji="1" lang="en-US" altLang="ko-KR" sz="1400" dirty="0">
+                <a:latin typeface="Noto Sans KR" panose="020B0500000000000000" pitchFamily="34" charset="-128"/>
+                <a:ea typeface="Noto Sans KR" panose="020B0500000000000000" pitchFamily="34" charset="-128"/>
+              </a:rPr>
+              <a:t>negate A[abs(A[3)] </a:t>
+            </a:r>
+            <a:endParaRPr kumimoji="1" lang="ko-KR" altLang="en-US" sz="1400" dirty="0">
+              <a:latin typeface="Noto Sans KR" panose="020B0500000000000000" pitchFamily="34" charset="-128"/>
+              <a:ea typeface="Noto Sans KR" panose="020B0500000000000000" pitchFamily="34" charset="-128"/>
+            </a:endParaRPr>
+          </a:p>
+        </p:txBody>
+      </p:sp>
+      <p:graphicFrame>
+        <p:nvGraphicFramePr>
+          <p:cNvPr id="39" name="표 6">
+            <a:extLst>
+              <a:ext uri="{FF2B5EF4-FFF2-40B4-BE49-F238E27FC236}">
+                <a16:creationId xmlns:a16="http://schemas.microsoft.com/office/drawing/2014/main" id="{B77CD9DB-8AE6-B84A-AB87-154E4F7C1221}"/>
+              </a:ext>
+            </a:extLst>
+          </p:cNvPr>
+          <p:cNvGraphicFramePr>
+            <a:graphicFrameLocks noGrp="1"/>
+          </p:cNvGraphicFramePr>
+          <p:nvPr>
+            <p:extLst>
+              <p:ext uri="{D42A27DB-BD31-4B8C-83A1-F6EECF244321}">
+                <p14:modId xmlns:p14="http://schemas.microsoft.com/office/powerpoint/2010/main" val="3718864072"/>
+              </p:ext>
+            </p:extLst>
+          </p:nvPr>
+        </p:nvGraphicFramePr>
+        <p:xfrm>
+          <a:off x="3603208" y="5395095"/>
+          <a:ext cx="6068390" cy="433271"/>
+        </p:xfrm>
+        <a:graphic>
+          <a:graphicData uri="http://schemas.openxmlformats.org/drawingml/2006/table">
+            <a:tbl>
+              <a:tblPr>
+                <a:tableStyleId>{073A0DAA-6AF3-43AB-8588-CEC1D06C72B9}</a:tableStyleId>
+              </a:tblPr>
+              <a:tblGrid>
+                <a:gridCol w="1213678">
+                  <a:extLst>
+                    <a:ext uri="{9D8B030D-6E8A-4147-A177-3AD203B41FA5}">
+                      <a16:colId xmlns:a16="http://schemas.microsoft.com/office/drawing/2014/main" val="2187071351"/>
+                    </a:ext>
+                  </a:extLst>
+                </a:gridCol>
+                <a:gridCol w="1213678">
+                  <a:extLst>
+                    <a:ext uri="{9D8B030D-6E8A-4147-A177-3AD203B41FA5}">
+                      <a16:colId xmlns:a16="http://schemas.microsoft.com/office/drawing/2014/main" val="1886188535"/>
+                    </a:ext>
+                  </a:extLst>
+                </a:gridCol>
+                <a:gridCol w="1213678">
+                  <a:extLst>
+                    <a:ext uri="{9D8B030D-6E8A-4147-A177-3AD203B41FA5}">
+                      <a16:colId xmlns:a16="http://schemas.microsoft.com/office/drawing/2014/main" val="3872917911"/>
+                    </a:ext>
+                  </a:extLst>
+                </a:gridCol>
+                <a:gridCol w="1213678">
+                  <a:extLst>
+                    <a:ext uri="{9D8B030D-6E8A-4147-A177-3AD203B41FA5}">
+                      <a16:colId xmlns:a16="http://schemas.microsoft.com/office/drawing/2014/main" val="3629664165"/>
+                    </a:ext>
+                  </a:extLst>
+                </a:gridCol>
+                <a:gridCol w="1213678">
+                  <a:extLst>
+                    <a:ext uri="{9D8B030D-6E8A-4147-A177-3AD203B41FA5}">
+                      <a16:colId xmlns:a16="http://schemas.microsoft.com/office/drawing/2014/main" val="2578642549"/>
+                    </a:ext>
+                  </a:extLst>
+                </a:gridCol>
+              </a:tblGrid>
+              <a:tr h="433271">
+                <a:tc>
+                  <a:txBody>
+                    <a:bodyPr/>
+                    <a:lstStyle/>
+                    <a:p>
+                      <a:pPr algn="ctr" latinLnBrk="1"/>
+                      <a:r>
+                        <a:rPr lang="en-US" altLang="ko-KR" b="0" i="0" dirty="0">
+                          <a:solidFill>
+                            <a:schemeClr val="tx1"/>
+                          </a:solidFill>
+                          <a:latin typeface="Noto Sans KR Medium" panose="020B0500000000000000" pitchFamily="34" charset="-128"/>
+                          <a:ea typeface="Noto Sans KR Medium" panose="020B0500000000000000" pitchFamily="34" charset="-128"/>
+                        </a:rPr>
+                        <a:t>-3</a:t>
+                      </a:r>
+                      <a:endParaRPr lang="ko-KR" altLang="en-US" b="0" i="0" dirty="0">
+                        <a:solidFill>
+                          <a:schemeClr val="tx1"/>
+                        </a:solidFill>
                         <a:latin typeface="Noto Sans KR Medium" panose="020B0500000000000000" pitchFamily="34" charset="-128"/>
                         <a:ea typeface="Noto Sans KR Medium" panose="020B0500000000000000" pitchFamily="34" charset="-128"/>
                       </a:endParaRPr>
@@ -6376,6 +6975,70 @@
                           <a:latin typeface="Noto Sans KR Medium" panose="020B0500000000000000" pitchFamily="34" charset="-128"/>
                           <a:ea typeface="Noto Sans KR Medium" panose="020B0500000000000000" pitchFamily="34" charset="-128"/>
                         </a:rPr>
+                        <a:t>0</a:t>
+                      </a:r>
+                      <a:endParaRPr lang="ko-KR" altLang="en-US" b="0" i="0" dirty="0">
+                        <a:solidFill>
+                          <a:srgbClr val="FF0000"/>
+                        </a:solidFill>
+                        <a:latin typeface="Noto Sans KR Medium" panose="020B0500000000000000" pitchFamily="34" charset="-128"/>
+                        <a:ea typeface="Noto Sans KR Medium" panose="020B0500000000000000" pitchFamily="34" charset="-128"/>
+                      </a:endParaRPr>
+                    </a:p>
+                  </a:txBody>
+                  <a:tcPr>
+                    <a:lnL w="12700" cap="flat" cmpd="sng" algn="ctr">
+                      <a:solidFill>
+                        <a:schemeClr val="tx1"/>
+                      </a:solidFill>
+                      <a:prstDash val="solid"/>
+                      <a:round/>
+                      <a:headEnd type="none" w="med" len="med"/>
+                      <a:tailEnd type="none" w="med" len="med"/>
+                    </a:lnL>
+                    <a:lnR w="12700" cap="flat" cmpd="sng" algn="ctr">
+                      <a:solidFill>
+                        <a:schemeClr val="tx1"/>
+                      </a:solidFill>
+                      <a:prstDash val="solid"/>
+                      <a:round/>
+                      <a:headEnd type="none" w="med" len="med"/>
+                      <a:tailEnd type="none" w="med" len="med"/>
+                    </a:lnR>
+                    <a:lnT w="12700" cap="flat" cmpd="sng" algn="ctr">
+                      <a:solidFill>
+                        <a:schemeClr val="tx1"/>
+                      </a:solidFill>
+                      <a:prstDash val="solid"/>
+                      <a:round/>
+                      <a:headEnd type="none" w="med" len="med"/>
+                      <a:tailEnd type="none" w="med" len="med"/>
+                    </a:lnT>
+                    <a:lnB w="12700" cap="flat" cmpd="sng" algn="ctr">
+                      <a:solidFill>
+                        <a:schemeClr val="tx1"/>
+                      </a:solidFill>
+                      <a:prstDash val="solid"/>
+                      <a:round/>
+                      <a:headEnd type="none" w="med" len="med"/>
+                      <a:tailEnd type="none" w="med" len="med"/>
+                    </a:lnB>
+                  </a:tcPr>
+                </a:tc>
+                <a:tc>
+                  <a:txBody>
+                    <a:bodyPr/>
+                    <a:lstStyle/>
+                    <a:p>
+                      <a:pPr algn="ctr" latinLnBrk="1"/>
+                      <a:r>
+                        <a:rPr lang="en-US" altLang="ko-KR" b="0" i="0" dirty="0">
+                          <a:solidFill>
+                            <a:schemeClr val="tx1"/>
+                          </a:solidFill>
+                          <a:latin typeface="Noto Sans KR Medium" panose="020B0500000000000000" pitchFamily="34" charset="-128"/>
+                          <a:ea typeface="Noto Sans KR Medium" panose="020B0500000000000000" pitchFamily="34" charset="-128"/>
+                        </a:rPr>
                         <a:t>-1</a:t>
                       </a:r>
                       <a:endParaRPr lang="ko-KR" altLang="en-US" b="0" i="0" dirty="0">
@@ -6496,10 +7159,10 @@
       </p:graphicFrame>
       <p:sp>
         <p:nvSpPr>
-          <p:cNvPr id="31" name="TextBox 30">
-            <a:extLst>
-              <a:ext uri="{FF2B5EF4-FFF2-40B4-BE49-F238E27FC236}">
-                <a16:creationId xmlns:a16="http://schemas.microsoft.com/office/drawing/2014/main" id="{D119D8AB-93A9-9A45-8B7E-69CB42982098}"/>
+          <p:cNvPr id="40" name="TextBox 39">
+            <a:extLst>
+              <a:ext uri="{FF2B5EF4-FFF2-40B4-BE49-F238E27FC236}">
+                <a16:creationId xmlns:a16="http://schemas.microsoft.com/office/drawing/2014/main" id="{D4B4F0FC-E753-C942-B3B9-4292860F30C0}"/>
               </a:ext>
             </a:extLst>
           </p:cNvPr>
@@ -6508,7 +7171,7 @@
         </p:nvSpPr>
         <p:spPr>
           <a:xfrm>
-            <a:off x="3985590" y="4753222"/>
+            <a:off x="3986416" y="5895162"/>
             <a:ext cx="675861" cy="307777"/>
           </a:xfrm>
           <a:prstGeom prst="rect">
@@ -6538,10 +7201,10 @@
       </p:sp>
       <p:sp>
         <p:nvSpPr>
-          <p:cNvPr id="32" name="TextBox 31">
-            <a:extLst>
-              <a:ext uri="{FF2B5EF4-FFF2-40B4-BE49-F238E27FC236}">
-                <a16:creationId xmlns:a16="http://schemas.microsoft.com/office/drawing/2014/main" id="{F932BE96-EA8D-894E-8443-F056225E8031}"/>
+          <p:cNvPr id="41" name="TextBox 40">
+            <a:extLst>
+              <a:ext uri="{FF2B5EF4-FFF2-40B4-BE49-F238E27FC236}">
+                <a16:creationId xmlns:a16="http://schemas.microsoft.com/office/drawing/2014/main" id="{0C3ED9C4-69AD-EA4C-B25A-8F3436A53BCB}"/>
               </a:ext>
             </a:extLst>
           </p:cNvPr>
@@ -6550,7 +7213,7 @@
         </p:nvSpPr>
         <p:spPr>
           <a:xfrm>
-            <a:off x="5231295" y="4753222"/>
+            <a:off x="5232121" y="5895162"/>
             <a:ext cx="675861" cy="307777"/>
           </a:xfrm>
           <a:prstGeom prst="rect">
@@ -6580,10 +7243,10 @@
       </p:sp>
       <p:sp>
         <p:nvSpPr>
-          <p:cNvPr id="33" name="TextBox 32">
-            <a:extLst>
-              <a:ext uri="{FF2B5EF4-FFF2-40B4-BE49-F238E27FC236}">
-                <a16:creationId xmlns:a16="http://schemas.microsoft.com/office/drawing/2014/main" id="{71EA34D8-6882-6643-BA36-1CE124B7C08F}"/>
+          <p:cNvPr id="42" name="TextBox 41">
+            <a:extLst>
+              <a:ext uri="{FF2B5EF4-FFF2-40B4-BE49-F238E27FC236}">
+                <a16:creationId xmlns:a16="http://schemas.microsoft.com/office/drawing/2014/main" id="{770876E5-6258-924C-8DD7-5BF46C623A09}"/>
               </a:ext>
             </a:extLst>
           </p:cNvPr>
@@ -6592,7 +7255,7 @@
         </p:nvSpPr>
         <p:spPr>
           <a:xfrm>
-            <a:off x="6404115" y="4753222"/>
+            <a:off x="6404941" y="5895162"/>
             <a:ext cx="675861" cy="307777"/>
           </a:xfrm>
           <a:prstGeom prst="rect">
@@ -6622,10 +7285,10 @@
       </p:sp>
       <p:sp>
         <p:nvSpPr>
-          <p:cNvPr id="34" name="TextBox 33">
-            <a:extLst>
-              <a:ext uri="{FF2B5EF4-FFF2-40B4-BE49-F238E27FC236}">
-                <a16:creationId xmlns:a16="http://schemas.microsoft.com/office/drawing/2014/main" id="{9355B778-1BCB-604F-BBCC-BC2E66F8A82E}"/>
+          <p:cNvPr id="43" name="TextBox 42">
+            <a:extLst>
+              <a:ext uri="{FF2B5EF4-FFF2-40B4-BE49-F238E27FC236}">
+                <a16:creationId xmlns:a16="http://schemas.microsoft.com/office/drawing/2014/main" id="{48398B53-4BDC-EC46-9B4F-C320E972B792}"/>
               </a:ext>
             </a:extLst>
           </p:cNvPr>
@@ -6634,7 +7297,7 @@
         </p:nvSpPr>
         <p:spPr>
           <a:xfrm>
-            <a:off x="7649820" y="4753222"/>
+            <a:off x="7650646" y="5895162"/>
             <a:ext cx="675861" cy="307777"/>
           </a:xfrm>
           <a:prstGeom prst="rect">
@@ -6664,10 +7327,10 @@
       </p:sp>
       <p:sp>
         <p:nvSpPr>
-          <p:cNvPr id="35" name="TextBox 34">
-            <a:extLst>
-              <a:ext uri="{FF2B5EF4-FFF2-40B4-BE49-F238E27FC236}">
-                <a16:creationId xmlns:a16="http://schemas.microsoft.com/office/drawing/2014/main" id="{2846ACD2-676B-B94C-8C7F-091F477B71F8}"/>
+          <p:cNvPr id="44" name="TextBox 43">
+            <a:extLst>
+              <a:ext uri="{FF2B5EF4-FFF2-40B4-BE49-F238E27FC236}">
+                <a16:creationId xmlns:a16="http://schemas.microsoft.com/office/drawing/2014/main" id="{5C821AFF-CD19-1048-A00F-B7F892DAF199}"/>
               </a:ext>
             </a:extLst>
           </p:cNvPr>
@@ -6676,7 +7339,7 @@
         </p:nvSpPr>
         <p:spPr>
           <a:xfrm>
-            <a:off x="8895524" y="4768338"/>
+            <a:off x="8896350" y="5910278"/>
             <a:ext cx="675861" cy="307777"/>
           </a:xfrm>
           <a:prstGeom prst="rect">

</xml_diff>